<commit_message>
Ajustando Página de Entregablesgit
</commit_message>
<xml_diff>
--- a/app/1_app_doc_proyecto/1er_Trim/1_Presentación_Sustentacion.pptx
+++ b/app/1_app_doc_proyecto/1er_Trim/1_Presentación_Sustentacion.pptx
@@ -220,7 +220,7 @@
           <a:p>
             <a:fld id="{7E6DFAF8-F7BA-48F4-B956-3CC1A9ACF6C9}" type="datetimeFigureOut">
               <a:rPr lang="es-CO" smtClean="0"/>
-              <a:t>24/03/2021</a:t>
+              <a:t>3/08/2021</a:t>
             </a:fld>
             <a:endParaRPr lang="es-CO"/>
           </a:p>
@@ -741,7 +741,7 @@
           <a:p>
             <a:fld id="{B3030C24-9424-B24A-8613-79990C3AA492}" type="datetimeFigureOut">
               <a:rPr lang="es-ES" smtClean="0"/>
-              <a:t>24/03/2021</a:t>
+              <a:t>03/08/2021</a:t>
             </a:fld>
             <a:endParaRPr lang="es-ES"/>
           </a:p>
@@ -921,7 +921,7 @@
           <a:p>
             <a:fld id="{B3030C24-9424-B24A-8613-79990C3AA492}" type="datetimeFigureOut">
               <a:rPr lang="es-ES" smtClean="0"/>
-              <a:t>24/03/2021</a:t>
+              <a:t>03/08/2021</a:t>
             </a:fld>
             <a:endParaRPr lang="es-ES"/>
           </a:p>
@@ -1565,7 +1565,7 @@
           <a:p>
             <a:fld id="{B3030C24-9424-B24A-8613-79990C3AA492}" type="datetimeFigureOut">
               <a:rPr lang="es-ES" smtClean="0"/>
-              <a:t>24/03/2021</a:t>
+              <a:t>03/08/2021</a:t>
             </a:fld>
             <a:endParaRPr lang="es-ES"/>
           </a:p>
@@ -1818,7 +1818,7 @@
           <a:p>
             <a:fld id="{B3030C24-9424-B24A-8613-79990C3AA492}" type="datetimeFigureOut">
               <a:rPr lang="es-ES" smtClean="0"/>
-              <a:t>24/03/2021</a:t>
+              <a:t>03/08/2021</a:t>
             </a:fld>
             <a:endParaRPr lang="es-ES"/>
           </a:p>
@@ -2031,7 +2031,7 @@
           <a:p>
             <a:fld id="{B3030C24-9424-B24A-8613-79990C3AA492}" type="datetimeFigureOut">
               <a:rPr lang="es-ES" smtClean="0"/>
-              <a:t>24/03/2021</a:t>
+              <a:t>03/08/2021</a:t>
             </a:fld>
             <a:endParaRPr lang="es-ES"/>
           </a:p>
@@ -3302,7 +3302,7 @@
         <p:spPr>
           <a:xfrm>
             <a:off x="382867" y="1232954"/>
-            <a:ext cx="8333294" cy="2308324"/>
+            <a:ext cx="8333294" cy="2554545"/>
           </a:xfrm>
           <a:prstGeom prst="rect">
             <a:avLst/>
@@ -3353,23 +3353,6 @@
               <a:buChar char="•"/>
             </a:pPr>
             <a:r>
-              <a:rPr lang="es-ES" sz="1600" dirty="0" smtClean="0">
-                <a:solidFill>
-                  <a:schemeClr val="tx1">
-                    <a:lumMod val="75000"/>
-                    <a:lumOff val="25000"/>
-                  </a:schemeClr>
-                </a:solidFill>
-              </a:rPr>
-              <a:t>Hasta dónde abarca</a:t>
-            </a:r>
-          </a:p>
-          <a:p>
-            <a:pPr marL="285750" indent="-285750">
-              <a:buFont typeface="Arial" panose="020B0604020202020204" pitchFamily="34" charset="0"/>
-              <a:buChar char="•"/>
-            </a:pPr>
-            <a:r>
               <a:rPr lang="es-ES" sz="1600" b="1" dirty="0" smtClean="0">
                 <a:solidFill>
                   <a:schemeClr val="tx1">
@@ -3482,6 +3465,67 @@
               </a:rPr>
               <a:t>, ModProceso5). </a:t>
             </a:r>
+            <a:endParaRPr lang="es-ES" sz="1600" dirty="0" smtClean="0">
+              <a:solidFill>
+                <a:schemeClr val="tx1">
+                  <a:lumMod val="75000"/>
+                  <a:lumOff val="25000"/>
+                </a:schemeClr>
+              </a:solidFill>
+            </a:endParaRPr>
+          </a:p>
+          <a:p>
+            <a:pPr marL="285750" indent="-285750">
+              <a:buFont typeface="Arial" panose="020B0604020202020204" pitchFamily="34" charset="0"/>
+              <a:buChar char="•"/>
+            </a:pPr>
+            <a:r>
+              <a:rPr lang="es-ES" sz="1600" dirty="0">
+                <a:solidFill>
+                  <a:schemeClr val="tx1">
+                    <a:lumMod val="75000"/>
+                    <a:lumOff val="25000"/>
+                  </a:schemeClr>
+                </a:solidFill>
+              </a:rPr>
+              <a:t>Hasta dónde abarca (Tiempo, evidencias)</a:t>
+            </a:r>
+          </a:p>
+          <a:p>
+            <a:pPr marL="285750" indent="-285750">
+              <a:buFont typeface="Arial" panose="020B0604020202020204" pitchFamily="34" charset="0"/>
+              <a:buChar char="•"/>
+            </a:pPr>
+            <a:r>
+              <a:rPr lang="es-ES" sz="1600" dirty="0" smtClean="0">
+                <a:solidFill>
+                  <a:schemeClr val="tx1">
+                    <a:lumMod val="75000"/>
+                    <a:lumOff val="25000"/>
+                  </a:schemeClr>
+                </a:solidFill>
+              </a:rPr>
+              <a:t>Descripción de tecnologías </a:t>
+            </a:r>
+            <a:r>
+              <a:rPr lang="es-ES" sz="1600" smtClean="0">
+                <a:solidFill>
+                  <a:schemeClr val="tx1">
+                    <a:lumMod val="75000"/>
+                    <a:lumOff val="25000"/>
+                  </a:schemeClr>
+                </a:solidFill>
+              </a:rPr>
+              <a:t>del proyecto</a:t>
+            </a:r>
+            <a:endParaRPr lang="es-ES" sz="1600" dirty="0">
+              <a:solidFill>
+                <a:schemeClr val="tx1">
+                  <a:lumMod val="75000"/>
+                  <a:lumOff val="25000"/>
+                </a:schemeClr>
+              </a:solidFill>
+            </a:endParaRPr>
           </a:p>
           <a:p>
             <a:endParaRPr lang="es-ES_tradnl" sz="1600" dirty="0">

</xml_diff>